<commit_message>
enabled the mac insertion in the p4 & copying of the dest_mac to src_mac for making above work.
</commit_message>
<xml_diff>
--- a/my_exercises/ipv6_examples/ioam/vpp_p4/p4_vpp_topology.pptx
+++ b/my_exercises/ipv6_examples/ioam/vpp_p4/p4_vpp_topology.pptx
@@ -105,6 +105,11 @@
       </a:defRPr>
     </a:lvl9pPr>
   </p:defaultTextStyle>
+  <p:extLst>
+    <p:ext uri="{EFAFB233-063F-42B5-8137-9DF3F51BA10A}">
+      <p15:sldGuideLst xmlns:p15="http://schemas.microsoft.com/office/powerpoint/2012/main"/>
+    </p:ext>
+  </p:extLst>
 </p:presentation>
 </file>
 
@@ -239,7 +244,7 @@
           <a:p>
             <a:fld id="{023A68D2-51BC-4D26-8EBB-F0D0E911C97C}" type="datetimeFigureOut">
               <a:rPr lang="en-GB" smtClean="0"/>
-              <a:t>26/10/2017</a:t>
+              <a:t>06/11/2017</a:t>
             </a:fld>
             <a:endParaRPr lang="en-GB"/>
           </a:p>
@@ -409,7 +414,7 @@
           <a:p>
             <a:fld id="{023A68D2-51BC-4D26-8EBB-F0D0E911C97C}" type="datetimeFigureOut">
               <a:rPr lang="en-GB" smtClean="0"/>
-              <a:t>26/10/2017</a:t>
+              <a:t>06/11/2017</a:t>
             </a:fld>
             <a:endParaRPr lang="en-GB"/>
           </a:p>
@@ -589,7 +594,7 @@
           <a:p>
             <a:fld id="{023A68D2-51BC-4D26-8EBB-F0D0E911C97C}" type="datetimeFigureOut">
               <a:rPr lang="en-GB" smtClean="0"/>
-              <a:t>26/10/2017</a:t>
+              <a:t>06/11/2017</a:t>
             </a:fld>
             <a:endParaRPr lang="en-GB"/>
           </a:p>
@@ -759,7 +764,7 @@
           <a:p>
             <a:fld id="{023A68D2-51BC-4D26-8EBB-F0D0E911C97C}" type="datetimeFigureOut">
               <a:rPr lang="en-GB" smtClean="0"/>
-              <a:t>26/10/2017</a:t>
+              <a:t>06/11/2017</a:t>
             </a:fld>
             <a:endParaRPr lang="en-GB"/>
           </a:p>
@@ -1005,7 +1010,7 @@
           <a:p>
             <a:fld id="{023A68D2-51BC-4D26-8EBB-F0D0E911C97C}" type="datetimeFigureOut">
               <a:rPr lang="en-GB" smtClean="0"/>
-              <a:t>26/10/2017</a:t>
+              <a:t>06/11/2017</a:t>
             </a:fld>
             <a:endParaRPr lang="en-GB"/>
           </a:p>
@@ -1237,7 +1242,7 @@
           <a:p>
             <a:fld id="{023A68D2-51BC-4D26-8EBB-F0D0E911C97C}" type="datetimeFigureOut">
               <a:rPr lang="en-GB" smtClean="0"/>
-              <a:t>26/10/2017</a:t>
+              <a:t>06/11/2017</a:t>
             </a:fld>
             <a:endParaRPr lang="en-GB"/>
           </a:p>
@@ -1604,7 +1609,7 @@
           <a:p>
             <a:fld id="{023A68D2-51BC-4D26-8EBB-F0D0E911C97C}" type="datetimeFigureOut">
               <a:rPr lang="en-GB" smtClean="0"/>
-              <a:t>26/10/2017</a:t>
+              <a:t>06/11/2017</a:t>
             </a:fld>
             <a:endParaRPr lang="en-GB"/>
           </a:p>
@@ -1722,7 +1727,7 @@
           <a:p>
             <a:fld id="{023A68D2-51BC-4D26-8EBB-F0D0E911C97C}" type="datetimeFigureOut">
               <a:rPr lang="en-GB" smtClean="0"/>
-              <a:t>26/10/2017</a:t>
+              <a:t>06/11/2017</a:t>
             </a:fld>
             <a:endParaRPr lang="en-GB"/>
           </a:p>
@@ -1817,7 +1822,7 @@
           <a:p>
             <a:fld id="{023A68D2-51BC-4D26-8EBB-F0D0E911C97C}" type="datetimeFigureOut">
               <a:rPr lang="en-GB" smtClean="0"/>
-              <a:t>26/10/2017</a:t>
+              <a:t>06/11/2017</a:t>
             </a:fld>
             <a:endParaRPr lang="en-GB"/>
           </a:p>
@@ -2094,7 +2099,7 @@
           <a:p>
             <a:fld id="{023A68D2-51BC-4D26-8EBB-F0D0E911C97C}" type="datetimeFigureOut">
               <a:rPr lang="en-GB" smtClean="0"/>
-              <a:t>26/10/2017</a:t>
+              <a:t>06/11/2017</a:t>
             </a:fld>
             <a:endParaRPr lang="en-GB"/>
           </a:p>
@@ -2347,7 +2352,7 @@
           <a:p>
             <a:fld id="{023A68D2-51BC-4D26-8EBB-F0D0E911C97C}" type="datetimeFigureOut">
               <a:rPr lang="en-GB" smtClean="0"/>
-              <a:t>26/10/2017</a:t>
+              <a:t>06/11/2017</a:t>
             </a:fld>
             <a:endParaRPr lang="en-GB"/>
           </a:p>
@@ -2560,7 +2565,7 @@
           <a:p>
             <a:fld id="{023A68D2-51BC-4D26-8EBB-F0D0E911C97C}" type="datetimeFigureOut">
               <a:rPr lang="en-GB" smtClean="0"/>
-              <a:t>26/10/2017</a:t>
+              <a:t>06/11/2017</a:t>
             </a:fld>
             <a:endParaRPr lang="en-GB"/>
           </a:p>
@@ -3217,11 +3222,7 @@
             <a:pPr algn="ctr"/>
             <a:r>
               <a:rPr lang="en-US" dirty="0" smtClean="0"/>
-              <a:t>P4</a:t>
-            </a:r>
-            <a:r>
-              <a:rPr lang="en-US" dirty="0" smtClean="0"/>
-              <a:t> Switch-S1</a:t>
+              <a:t>P4 Switch-S1</a:t>
             </a:r>
             <a:endParaRPr lang="en-GB" dirty="0"/>
           </a:p>
@@ -3263,11 +3264,7 @@
             <a:pPr algn="ctr"/>
             <a:r>
               <a:rPr lang="en-US" dirty="0" smtClean="0"/>
-              <a:t>P4</a:t>
-            </a:r>
-            <a:r>
-              <a:rPr lang="en-US" dirty="0" smtClean="0"/>
-              <a:t> Switch-S2</a:t>
+              <a:t>P4 Switch-S2</a:t>
             </a:r>
             <a:endParaRPr lang="en-GB" dirty="0"/>
           </a:p>
@@ -4647,6 +4644,300 @@
                 <a:srgbClr val="FF0000"/>
               </a:solidFill>
             </a:endParaRPr>
+          </a:p>
+        </p:txBody>
+      </p:sp>
+      <p:sp>
+        <p:nvSpPr>
+          <p:cNvPr id="2" name="TextBox 1"/>
+          <p:cNvSpPr txBox="1"/>
+          <p:nvPr/>
+        </p:nvSpPr>
+        <p:spPr>
+          <a:xfrm>
+            <a:off x="7562419" y="1066164"/>
+            <a:ext cx="2776673" cy="307777"/>
+          </a:xfrm>
+          <a:prstGeom prst="rect">
+            <a:avLst/>
+          </a:prstGeom>
+          <a:noFill/>
+        </p:spPr>
+        <p:txBody>
+          <a:bodyPr wrap="square" rtlCol="0">
+            <a:spAutoFit/>
+          </a:bodyPr>
+          <a:lstStyle/>
+          <a:p>
+            <a:r>
+              <a:rPr lang="en-GB" sz="700" dirty="0" err="1"/>
+              <a:t>table_add</a:t>
+            </a:r>
+            <a:r>
+              <a:rPr lang="en-GB" sz="700" dirty="0"/>
+              <a:t> ipv6_lpm ipv6_forward db05::2/64 =&gt;</a:t>
+            </a:r>
+            <a:r>
+              <a:rPr lang="en-GB" sz="700" b="1" dirty="0">
+                <a:solidFill>
+                  <a:srgbClr val="FF0000"/>
+                </a:solidFill>
+              </a:rPr>
+              <a:t> 02:fe:2c:49:62:2b </a:t>
+            </a:r>
+            <a:r>
+              <a:rPr lang="en-GB" sz="700" dirty="0"/>
+              <a:t>2</a:t>
+            </a:r>
+          </a:p>
+          <a:p>
+            <a:r>
+              <a:rPr lang="en-GB" sz="700" dirty="0" err="1"/>
+              <a:t>table_add</a:t>
+            </a:r>
+            <a:r>
+              <a:rPr lang="en-GB" sz="700" dirty="0"/>
+              <a:t> ipv6_lpm ipv6_forward db00::2/64 =&gt; </a:t>
+            </a:r>
+            <a:r>
+              <a:rPr lang="en-GB" sz="700" b="1" dirty="0">
+                <a:solidFill>
+                  <a:srgbClr val="FF0000"/>
+                </a:solidFill>
+              </a:rPr>
+              <a:t>02:fe:4e:28:dd:9a</a:t>
+            </a:r>
+            <a:r>
+              <a:rPr lang="en-GB" sz="700" dirty="0"/>
+              <a:t> 1</a:t>
+            </a:r>
+          </a:p>
+        </p:txBody>
+      </p:sp>
+      <p:sp>
+        <p:nvSpPr>
+          <p:cNvPr id="50" name="TextBox 49"/>
+          <p:cNvSpPr txBox="1"/>
+          <p:nvPr/>
+        </p:nvSpPr>
+        <p:spPr>
+          <a:xfrm>
+            <a:off x="3059466" y="1206430"/>
+            <a:ext cx="3716459" cy="307777"/>
+          </a:xfrm>
+          <a:prstGeom prst="rect">
+            <a:avLst/>
+          </a:prstGeom>
+          <a:noFill/>
+        </p:spPr>
+        <p:txBody>
+          <a:bodyPr wrap="square" rtlCol="0">
+            <a:spAutoFit/>
+          </a:bodyPr>
+          <a:lstStyle/>
+          <a:p>
+            <a:r>
+              <a:rPr lang="en-GB" sz="700" dirty="0" err="1"/>
+              <a:t>table_add</a:t>
+            </a:r>
+            <a:r>
+              <a:rPr lang="en-GB" sz="700" dirty="0"/>
+              <a:t> ipv6_lpm ipv6_forward db05::2/64 =&gt; </a:t>
+            </a:r>
+            <a:r>
+              <a:rPr lang="en-GB" sz="700" b="1" dirty="0">
+                <a:solidFill>
+                  <a:srgbClr val="FF0000"/>
+                </a:solidFill>
+              </a:rPr>
+              <a:t>02:fe:db:7e:c9:0a </a:t>
+            </a:r>
+            <a:r>
+              <a:rPr lang="en-GB" sz="700" dirty="0"/>
+              <a:t>2</a:t>
+            </a:r>
+          </a:p>
+          <a:p>
+            <a:r>
+              <a:rPr lang="en-GB" sz="700" dirty="0" err="1"/>
+              <a:t>table_add</a:t>
+            </a:r>
+            <a:r>
+              <a:rPr lang="en-GB" sz="700" dirty="0"/>
+              <a:t> ipv6_lpm ipv6_forward db00::2/64 =&gt; </a:t>
+            </a:r>
+            <a:r>
+              <a:rPr lang="en-GB" sz="700" b="1" dirty="0">
+                <a:solidFill>
+                  <a:srgbClr val="FF0000"/>
+                </a:solidFill>
+              </a:rPr>
+              <a:t>02:fe:27:ae:1b:49</a:t>
+            </a:r>
+            <a:r>
+              <a:rPr lang="en-GB" sz="700" dirty="0"/>
+              <a:t> 1</a:t>
+            </a:r>
+          </a:p>
+        </p:txBody>
+      </p:sp>
+      <p:sp>
+        <p:nvSpPr>
+          <p:cNvPr id="3" name="TextBox 2"/>
+          <p:cNvSpPr txBox="1"/>
+          <p:nvPr/>
+        </p:nvSpPr>
+        <p:spPr>
+          <a:xfrm>
+            <a:off x="5564038" y="3648974"/>
+            <a:ext cx="2545890" cy="215444"/>
+          </a:xfrm>
+          <a:prstGeom prst="rect">
+            <a:avLst/>
+          </a:prstGeom>
+          <a:noFill/>
+        </p:spPr>
+        <p:txBody>
+          <a:bodyPr wrap="none" rtlCol="0">
+            <a:spAutoFit/>
+          </a:bodyPr>
+          <a:lstStyle/>
+          <a:p>
+            <a:r>
+              <a:rPr lang="en-GB" sz="800" b="1" dirty="0">
+                <a:solidFill>
+                  <a:srgbClr val="FF0000"/>
+                </a:solidFill>
+              </a:rPr>
+              <a:t>set interface mac address host-l_ b1    </a:t>
+            </a:r>
+            <a:r>
+              <a:rPr lang="en-GB" sz="800" b="1" dirty="0" smtClean="0">
+                <a:solidFill>
+                  <a:srgbClr val="FF0000"/>
+                </a:solidFill>
+              </a:rPr>
+              <a:t>02:fe:db:7e:c9:0a</a:t>
+            </a:r>
+            <a:endParaRPr lang="en-GB" dirty="0"/>
+          </a:p>
+        </p:txBody>
+      </p:sp>
+      <p:sp>
+        <p:nvSpPr>
+          <p:cNvPr id="52" name="TextBox 51"/>
+          <p:cNvSpPr txBox="1"/>
+          <p:nvPr/>
+        </p:nvSpPr>
+        <p:spPr>
+          <a:xfrm>
+            <a:off x="1949330" y="3230114"/>
+            <a:ext cx="2547492" cy="215444"/>
+          </a:xfrm>
+          <a:prstGeom prst="rect">
+            <a:avLst/>
+          </a:prstGeom>
+          <a:noFill/>
+        </p:spPr>
+        <p:txBody>
+          <a:bodyPr wrap="none" rtlCol="0">
+            <a:spAutoFit/>
+          </a:bodyPr>
+          <a:lstStyle/>
+          <a:p>
+            <a:r>
+              <a:rPr lang="en-GB" sz="800" b="1" dirty="0">
+                <a:solidFill>
+                  <a:srgbClr val="FF0000"/>
+                </a:solidFill>
+              </a:rPr>
+              <a:t>set interface mac address host-l_ a2    </a:t>
+            </a:r>
+            <a:r>
+              <a:rPr lang="en-GB" sz="800" b="1" dirty="0" smtClean="0">
+                <a:solidFill>
+                  <a:srgbClr val="FF0000"/>
+                </a:solidFill>
+              </a:rPr>
+              <a:t>02:fe:27:ae:1b:49</a:t>
+            </a:r>
+            <a:endParaRPr lang="en-GB" dirty="0"/>
+          </a:p>
+        </p:txBody>
+      </p:sp>
+      <p:sp>
+        <p:nvSpPr>
+          <p:cNvPr id="53" name="TextBox 52"/>
+          <p:cNvSpPr txBox="1"/>
+          <p:nvPr/>
+        </p:nvSpPr>
+        <p:spPr>
+          <a:xfrm>
+            <a:off x="6198200" y="1558872"/>
+            <a:ext cx="2486578" cy="215444"/>
+          </a:xfrm>
+          <a:prstGeom prst="rect">
+            <a:avLst/>
+          </a:prstGeom>
+          <a:noFill/>
+        </p:spPr>
+        <p:txBody>
+          <a:bodyPr wrap="none" rtlCol="0">
+            <a:spAutoFit/>
+          </a:bodyPr>
+          <a:lstStyle/>
+          <a:p>
+            <a:r>
+              <a:rPr lang="en-GB" sz="800" b="1" dirty="0">
+                <a:solidFill>
+                  <a:srgbClr val="FF0000"/>
+                </a:solidFill>
+              </a:rPr>
+              <a:t>set interface mac address host-l_ b2 02:fe:4e:28:dd:9a</a:t>
+            </a:r>
+            <a:endParaRPr lang="en-GB" dirty="0"/>
+          </a:p>
+        </p:txBody>
+      </p:sp>
+      <p:sp>
+        <p:nvSpPr>
+          <p:cNvPr id="54" name="TextBox 53"/>
+          <p:cNvSpPr txBox="1"/>
+          <p:nvPr/>
+        </p:nvSpPr>
+        <p:spPr>
+          <a:xfrm>
+            <a:off x="9208097" y="3534348"/>
+            <a:ext cx="2509020" cy="215444"/>
+          </a:xfrm>
+          <a:prstGeom prst="rect">
+            <a:avLst/>
+          </a:prstGeom>
+          <a:noFill/>
+        </p:spPr>
+        <p:txBody>
+          <a:bodyPr wrap="none" rtlCol="0">
+            <a:spAutoFit/>
+          </a:bodyPr>
+          <a:lstStyle/>
+          <a:p>
+            <a:r>
+              <a:rPr lang="en-GB" sz="800" b="1" dirty="0">
+                <a:solidFill>
+                  <a:srgbClr val="FF0000"/>
+                </a:solidFill>
+              </a:rPr>
+              <a:t>set interface mac address host-l_ c1   </a:t>
+            </a:r>
+            <a:r>
+              <a:rPr lang="en-GB" sz="800" b="1" dirty="0" smtClean="0">
+                <a:solidFill>
+                  <a:srgbClr val="FF0000"/>
+                </a:solidFill>
+              </a:rPr>
+              <a:t>02:fe:2c:49:62:2b</a:t>
+            </a:r>
+            <a:endParaRPr lang="en-GB" dirty="0"/>
           </a:p>
         </p:txBody>
       </p:sp>

</xml_diff>